<commit_message>
changes to dev branch.
</commit_message>
<xml_diff>
--- a/Documentation/DevOps-Automation/DevOps-Architecture_cal-eStore.pptx
+++ b/Documentation/DevOps-Automation/DevOps-Architecture_cal-eStore.pptx
@@ -243,7 +243,7 @@
           <a:p>
             <a:fld id="{0A64800B-EB10-43B2-A0FE-B5B779CD5B52}" type="datetimeFigureOut">
               <a:rPr lang="en-US" smtClean="0"/>
-              <a:t>2/15/2017</a:t>
+              <a:t>2/19/2017</a:t>
             </a:fld>
             <a:endParaRPr lang="en-US"/>
           </a:p>
@@ -413,7 +413,7 @@
           <a:p>
             <a:fld id="{0A64800B-EB10-43B2-A0FE-B5B779CD5B52}" type="datetimeFigureOut">
               <a:rPr lang="en-US" smtClean="0"/>
-              <a:t>2/15/2017</a:t>
+              <a:t>2/19/2017</a:t>
             </a:fld>
             <a:endParaRPr lang="en-US"/>
           </a:p>
@@ -593,7 +593,7 @@
           <a:p>
             <a:fld id="{0A64800B-EB10-43B2-A0FE-B5B779CD5B52}" type="datetimeFigureOut">
               <a:rPr lang="en-US" smtClean="0"/>
-              <a:t>2/15/2017</a:t>
+              <a:t>2/19/2017</a:t>
             </a:fld>
             <a:endParaRPr lang="en-US"/>
           </a:p>
@@ -763,7 +763,7 @@
           <a:p>
             <a:fld id="{0A64800B-EB10-43B2-A0FE-B5B779CD5B52}" type="datetimeFigureOut">
               <a:rPr lang="en-US" smtClean="0"/>
-              <a:t>2/15/2017</a:t>
+              <a:t>2/19/2017</a:t>
             </a:fld>
             <a:endParaRPr lang="en-US"/>
           </a:p>
@@ -1009,7 +1009,7 @@
           <a:p>
             <a:fld id="{0A64800B-EB10-43B2-A0FE-B5B779CD5B52}" type="datetimeFigureOut">
               <a:rPr lang="en-US" smtClean="0"/>
-              <a:t>2/15/2017</a:t>
+              <a:t>2/19/2017</a:t>
             </a:fld>
             <a:endParaRPr lang="en-US"/>
           </a:p>
@@ -1241,7 +1241,7 @@
           <a:p>
             <a:fld id="{0A64800B-EB10-43B2-A0FE-B5B779CD5B52}" type="datetimeFigureOut">
               <a:rPr lang="en-US" smtClean="0"/>
-              <a:t>2/15/2017</a:t>
+              <a:t>2/19/2017</a:t>
             </a:fld>
             <a:endParaRPr lang="en-US"/>
           </a:p>
@@ -1608,7 +1608,7 @@
           <a:p>
             <a:fld id="{0A64800B-EB10-43B2-A0FE-B5B779CD5B52}" type="datetimeFigureOut">
               <a:rPr lang="en-US" smtClean="0"/>
-              <a:t>2/15/2017</a:t>
+              <a:t>2/19/2017</a:t>
             </a:fld>
             <a:endParaRPr lang="en-US"/>
           </a:p>
@@ -1726,7 +1726,7 @@
           <a:p>
             <a:fld id="{0A64800B-EB10-43B2-A0FE-B5B779CD5B52}" type="datetimeFigureOut">
               <a:rPr lang="en-US" smtClean="0"/>
-              <a:t>2/15/2017</a:t>
+              <a:t>2/19/2017</a:t>
             </a:fld>
             <a:endParaRPr lang="en-US"/>
           </a:p>
@@ -1821,7 +1821,7 @@
           <a:p>
             <a:fld id="{0A64800B-EB10-43B2-A0FE-B5B779CD5B52}" type="datetimeFigureOut">
               <a:rPr lang="en-US" smtClean="0"/>
-              <a:t>2/15/2017</a:t>
+              <a:t>2/19/2017</a:t>
             </a:fld>
             <a:endParaRPr lang="en-US"/>
           </a:p>
@@ -2098,7 +2098,7 @@
           <a:p>
             <a:fld id="{0A64800B-EB10-43B2-A0FE-B5B779CD5B52}" type="datetimeFigureOut">
               <a:rPr lang="en-US" smtClean="0"/>
-              <a:t>2/15/2017</a:t>
+              <a:t>2/19/2017</a:t>
             </a:fld>
             <a:endParaRPr lang="en-US"/>
           </a:p>
@@ -2351,7 +2351,7 @@
           <a:p>
             <a:fld id="{0A64800B-EB10-43B2-A0FE-B5B779CD5B52}" type="datetimeFigureOut">
               <a:rPr lang="en-US" smtClean="0"/>
-              <a:t>2/15/2017</a:t>
+              <a:t>2/19/2017</a:t>
             </a:fld>
             <a:endParaRPr lang="en-US"/>
           </a:p>
@@ -2564,7 +2564,7 @@
           <a:p>
             <a:fld id="{0A64800B-EB10-43B2-A0FE-B5B779CD5B52}" type="datetimeFigureOut">
               <a:rPr lang="en-US" smtClean="0"/>
-              <a:t>2/15/2017</a:t>
+              <a:t>2/19/2017</a:t>
             </a:fld>
             <a:endParaRPr lang="en-US"/>
           </a:p>
@@ -4377,7 +4377,6 @@
               <a:rPr lang="en-US" b="1" dirty="0"/>
               <a:t>Continuous Delivery (CD)</a:t>
             </a:r>
-            <a:endParaRPr lang="en-US" b="1" dirty="0"/>
           </a:p>
         </p:txBody>
       </p:sp>
@@ -4892,6 +4891,51 @@
                 </a:solidFill>
               </a:rPr>
               <a:t>Application, system monitoring and self-healing</a:t>
+            </a:r>
+          </a:p>
+        </p:txBody>
+      </p:sp>
+      <p:sp>
+        <p:nvSpPr>
+          <p:cNvPr id="55" name="Rounded Rectangle 54"/>
+          <p:cNvSpPr/>
+          <p:nvPr/>
+        </p:nvSpPr>
+        <p:spPr>
+          <a:xfrm>
+            <a:off x="10895852" y="4962120"/>
+            <a:ext cx="750636" cy="341802"/>
+          </a:xfrm>
+          <a:prstGeom prst="roundRect">
+            <a:avLst/>
+          </a:prstGeom>
+        </p:spPr>
+        <p:style>
+          <a:lnRef idx="1">
+            <a:schemeClr val="accent3"/>
+          </a:lnRef>
+          <a:fillRef idx="2">
+            <a:schemeClr val="accent3"/>
+          </a:fillRef>
+          <a:effectRef idx="1">
+            <a:schemeClr val="accent3"/>
+          </a:effectRef>
+          <a:fontRef idx="minor">
+            <a:schemeClr val="dk1"/>
+          </a:fontRef>
+        </p:style>
+        <p:txBody>
+          <a:bodyPr rtlCol="0" anchor="ctr"/>
+          <a:lstStyle/>
+          <a:p>
+            <a:pPr algn="ctr"/>
+            <a:r>
+              <a:rPr lang="en-US" sz="1400" dirty="0" smtClean="0">
+                <a:solidFill>
+                  <a:srgbClr val="0070C0"/>
+                </a:solidFill>
+              </a:rPr>
+              <a:t>Testing</a:t>
             </a:r>
             <a:endParaRPr lang="en-US" sz="1400" dirty="0">
               <a:solidFill>

</xml_diff>